<commit_message>
Add bidi properies to ar-SA templates
</commit_message>
<xml_diff>
--- a/new/ar-SA/new.pptx
+++ b/new/ar-SA/new.pptx
@@ -1,6 +1,6 @@
 
 <file path=ppt/presentation.xml><?xml version="1.0" encoding="utf-8"?>
-<p:presentation xmlns:a="http://schemas.openxmlformats.org/drawingml/2006/main" xmlns:r="http://schemas.openxmlformats.org/officeDocument/2006/relationships" xmlns:p="http://schemas.openxmlformats.org/presentationml/2006/main" saveSubsetFonts="1">
+<p:presentation xmlns:a="http://schemas.openxmlformats.org/drawingml/2006/main" xmlns:r="http://schemas.openxmlformats.org/officeDocument/2006/relationships" xmlns:p="http://schemas.openxmlformats.org/presentationml/2006/main" rtl="1" saveSubsetFonts="1">
   <p:sldMasterIdLst>
     <p:sldMasterId id="2147483648" r:id="rId1"/>
   </p:sldMasterIdLst>
@@ -13,7 +13,7 @@
     <a:defPPr>
       <a:defRPr lang="ar-SA"/>
     </a:defPPr>
-    <a:lvl1pPr marL="0" algn="l" defTabSz="914400" rtl="0" eaLnBrk="1" latinLnBrk="0" hangingPunct="1">
+    <a:lvl1pPr marL="0" algn="r" defTabSz="914400" rtl="1" eaLnBrk="1" latinLnBrk="0" hangingPunct="1">
       <a:defRPr sz="1800" kern="1200">
         <a:solidFill>
           <a:schemeClr val="tx1"/>
@@ -23,7 +23,7 @@
         <a:cs typeface="+mn-cs"/>
       </a:defRPr>
     </a:lvl1pPr>
-    <a:lvl2pPr marL="457200" algn="l" defTabSz="914400" rtl="0" eaLnBrk="1" latinLnBrk="0" hangingPunct="1">
+    <a:lvl2pPr marL="457200" algn="r" defTabSz="914400" rtl="1" eaLnBrk="1" latinLnBrk="0" hangingPunct="1">
       <a:defRPr sz="1800" kern="1200">
         <a:solidFill>
           <a:schemeClr val="tx1"/>
@@ -33,7 +33,7 @@
         <a:cs typeface="+mn-cs"/>
       </a:defRPr>
     </a:lvl2pPr>
-    <a:lvl3pPr marL="914400" algn="l" defTabSz="914400" rtl="0" eaLnBrk="1" latinLnBrk="0" hangingPunct="1">
+    <a:lvl3pPr marL="914400" algn="r" defTabSz="914400" rtl="1" eaLnBrk="1" latinLnBrk="0" hangingPunct="1">
       <a:defRPr sz="1800" kern="1200">
         <a:solidFill>
           <a:schemeClr val="tx1"/>
@@ -43,7 +43,7 @@
         <a:cs typeface="+mn-cs"/>
       </a:defRPr>
     </a:lvl3pPr>
-    <a:lvl4pPr marL="1371600" algn="l" defTabSz="914400" rtl="0" eaLnBrk="1" latinLnBrk="0" hangingPunct="1">
+    <a:lvl4pPr marL="1371600" algn="r" defTabSz="914400" rtl="1" eaLnBrk="1" latinLnBrk="0" hangingPunct="1">
       <a:defRPr sz="1800" kern="1200">
         <a:solidFill>
           <a:schemeClr val="tx1"/>
@@ -53,7 +53,7 @@
         <a:cs typeface="+mn-cs"/>
       </a:defRPr>
     </a:lvl4pPr>
-    <a:lvl5pPr marL="1828800" algn="l" defTabSz="914400" rtl="0" eaLnBrk="1" latinLnBrk="0" hangingPunct="1">
+    <a:lvl5pPr marL="1828800" algn="r" defTabSz="914400" rtl="1" eaLnBrk="1" latinLnBrk="0" hangingPunct="1">
       <a:defRPr sz="1800" kern="1200">
         <a:solidFill>
           <a:schemeClr val="tx1"/>
@@ -63,7 +63,7 @@
         <a:cs typeface="+mn-cs"/>
       </a:defRPr>
     </a:lvl5pPr>
-    <a:lvl6pPr marL="2286000" algn="l" defTabSz="914400" rtl="0" eaLnBrk="1" latinLnBrk="0" hangingPunct="1">
+    <a:lvl6pPr marL="2286000" algn="r" defTabSz="914400" rtl="1" eaLnBrk="1" latinLnBrk="0" hangingPunct="1">
       <a:defRPr sz="1800" kern="1200">
         <a:solidFill>
           <a:schemeClr val="tx1"/>
@@ -73,7 +73,7 @@
         <a:cs typeface="+mn-cs"/>
       </a:defRPr>
     </a:lvl6pPr>
-    <a:lvl7pPr marL="2743200" algn="l" defTabSz="914400" rtl="0" eaLnBrk="1" latinLnBrk="0" hangingPunct="1">
+    <a:lvl7pPr marL="2743200" algn="r" defTabSz="914400" rtl="1" eaLnBrk="1" latinLnBrk="0" hangingPunct="1">
       <a:defRPr sz="1800" kern="1200">
         <a:solidFill>
           <a:schemeClr val="tx1"/>
@@ -83,7 +83,7 @@
         <a:cs typeface="+mn-cs"/>
       </a:defRPr>
     </a:lvl7pPr>
-    <a:lvl8pPr marL="3200400" algn="l" defTabSz="914400" rtl="0" eaLnBrk="1" latinLnBrk="0" hangingPunct="1">
+    <a:lvl8pPr marL="3200400" algn="r" defTabSz="914400" rtl="1" eaLnBrk="1" latinLnBrk="0" hangingPunct="1">
       <a:defRPr sz="1800" kern="1200">
         <a:solidFill>
           <a:schemeClr val="tx1"/>
@@ -93,7 +93,7 @@
         <a:cs typeface="+mn-cs"/>
       </a:defRPr>
     </a:lvl8pPr>
-    <a:lvl9pPr marL="3657600" algn="l" defTabSz="914400" rtl="0" eaLnBrk="1" latinLnBrk="0" hangingPunct="1">
+    <a:lvl9pPr marL="3657600" algn="r" defTabSz="914400" rtl="1" eaLnBrk="1" latinLnBrk="0" hangingPunct="1">
       <a:defRPr sz="1800" kern="1200">
         <a:solidFill>
           <a:schemeClr val="tx1"/>
@@ -2435,7 +2435,7 @@
           </a:prstGeom>
         </p:spPr>
         <p:txBody>
-          <a:bodyPr vert="horz" lIns="91440" tIns="45720" rIns="91440" bIns="45720" rtlCol="0" anchor="ctr">
+          <a:bodyPr vert="horz" lIns="91440" tIns="45720" rIns="91440" bIns="45720" rtlCol="1" anchor="ctr">
             <a:normAutofit/>
           </a:bodyPr>
           <a:lstStyle/>
@@ -2467,7 +2467,7 @@
           </a:prstGeom>
         </p:spPr>
         <p:txBody>
-          <a:bodyPr vert="horz" lIns="91440" tIns="45720" rIns="91440" bIns="45720" rtlCol="0">
+          <a:bodyPr vert="horz" lIns="91440" tIns="45720" rIns="91440" bIns="45720" rtlCol="1">
             <a:normAutofit/>
           </a:bodyPr>
           <a:lstStyle/>
@@ -2528,9 +2528,9 @@
           </a:prstGeom>
         </p:spPr>
         <p:txBody>
-          <a:bodyPr vert="horz" lIns="91440" tIns="45720" rIns="91440" bIns="45720" rtlCol="0" anchor="ctr"/>
+          <a:bodyPr vert="horz" lIns="91440" tIns="45720" rIns="91440" bIns="45720" rtlCol="1" anchor="ctr"/>
           <a:lstStyle>
-            <a:lvl1pPr algn="l">
+            <a:lvl1pPr algn="r">
               <a:defRPr sz="1200">
                 <a:solidFill>
                   <a:schemeClr val="tx1">
@@ -2569,7 +2569,7 @@
           </a:prstGeom>
         </p:spPr>
         <p:txBody>
-          <a:bodyPr vert="horz" lIns="91440" tIns="45720" rIns="91440" bIns="45720" rtlCol="0" anchor="ctr"/>
+          <a:bodyPr vert="horz" lIns="91440" tIns="45720" rIns="91440" bIns="45720" rtlCol="1" anchor="ctr"/>
           <a:lstStyle>
             <a:lvl1pPr algn="ctr">
               <a:defRPr sz="1200">
@@ -2606,7 +2606,7 @@
           </a:prstGeom>
         </p:spPr>
         <p:txBody>
-          <a:bodyPr vert="horz" lIns="91440" tIns="45720" rIns="91440" bIns="45720" rtlCol="0" anchor="ctr"/>
+          <a:bodyPr vert="horz" lIns="91440" tIns="45720" rIns="91440" bIns="45720" rtlCol="1" anchor="ctr"/>
           <a:lstStyle>
             <a:lvl1pPr algn="r">
               <a:defRPr sz="1200">
@@ -2650,7 +2650,7 @@
   </p:sldLayoutIdLst>
   <p:txStyles>
     <p:titleStyle>
-      <a:lvl1pPr algn="l" defTabSz="914400" rtl="0" eaLnBrk="1" latinLnBrk="0" hangingPunct="1">
+      <a:lvl1pPr algn="r" defTabSz="914400" rtl="1" eaLnBrk="1" latinLnBrk="0" hangingPunct="1">
         <a:lnSpc>
           <a:spcPct val="90000"/>
         </a:lnSpc>
@@ -2669,7 +2669,7 @@
       </a:lvl1pPr>
     </p:titleStyle>
     <p:bodyStyle>
-      <a:lvl1pPr marL="228600" indent="-228600" algn="l" defTabSz="914400" rtl="0" eaLnBrk="1" latinLnBrk="0" hangingPunct="1">
+      <a:lvl1pPr marL="228600" indent="-228600" algn="r" defTabSz="914400" rtl="1" eaLnBrk="1" latinLnBrk="0" hangingPunct="1">
         <a:lnSpc>
           <a:spcPct val="90000"/>
         </a:lnSpc>
@@ -2687,7 +2687,7 @@
           <a:cs typeface="+mn-cs"/>
         </a:defRPr>
       </a:lvl1pPr>
-      <a:lvl2pPr marL="685800" indent="-228600" algn="l" defTabSz="914400" rtl="0" eaLnBrk="1" latinLnBrk="0" hangingPunct="1">
+      <a:lvl2pPr marL="685800" indent="-228600" algn="r" defTabSz="914400" rtl="1" eaLnBrk="1" latinLnBrk="0" hangingPunct="1">
         <a:lnSpc>
           <a:spcPct val="90000"/>
         </a:lnSpc>
@@ -2705,7 +2705,7 @@
           <a:cs typeface="+mn-cs"/>
         </a:defRPr>
       </a:lvl2pPr>
-      <a:lvl3pPr marL="1143000" indent="-228600" algn="l" defTabSz="914400" rtl="0" eaLnBrk="1" latinLnBrk="0" hangingPunct="1">
+      <a:lvl3pPr marL="1143000" indent="-228600" algn="r" defTabSz="914400" rtl="1" eaLnBrk="1" latinLnBrk="0" hangingPunct="1">
         <a:lnSpc>
           <a:spcPct val="90000"/>
         </a:lnSpc>
@@ -2723,7 +2723,7 @@
           <a:cs typeface="+mn-cs"/>
         </a:defRPr>
       </a:lvl3pPr>
-      <a:lvl4pPr marL="1600200" indent="-228600" algn="l" defTabSz="914400" rtl="0" eaLnBrk="1" latinLnBrk="0" hangingPunct="1">
+      <a:lvl4pPr marL="1600200" indent="-228600" algn="r" defTabSz="914400" rtl="1" eaLnBrk="1" latinLnBrk="0" hangingPunct="1">
         <a:lnSpc>
           <a:spcPct val="90000"/>
         </a:lnSpc>
@@ -2741,7 +2741,7 @@
           <a:cs typeface="+mn-cs"/>
         </a:defRPr>
       </a:lvl4pPr>
-      <a:lvl5pPr marL="2057400" indent="-228600" algn="l" defTabSz="914400" rtl="0" eaLnBrk="1" latinLnBrk="0" hangingPunct="1">
+      <a:lvl5pPr marL="2057400" indent="-228600" algn="r" defTabSz="914400" rtl="1" eaLnBrk="1" latinLnBrk="0" hangingPunct="1">
         <a:lnSpc>
           <a:spcPct val="90000"/>
         </a:lnSpc>
@@ -2759,7 +2759,7 @@
           <a:cs typeface="+mn-cs"/>
         </a:defRPr>
       </a:lvl5pPr>
-      <a:lvl6pPr marL="2514600" indent="-228600" algn="l" defTabSz="914400" rtl="0" eaLnBrk="1" latinLnBrk="0" hangingPunct="1">
+      <a:lvl6pPr marL="2514600" indent="-228600" algn="r" defTabSz="914400" rtl="1" eaLnBrk="1" latinLnBrk="0" hangingPunct="1">
         <a:lnSpc>
           <a:spcPct val="90000"/>
         </a:lnSpc>
@@ -2777,7 +2777,7 @@
           <a:cs typeface="+mn-cs"/>
         </a:defRPr>
       </a:lvl6pPr>
-      <a:lvl7pPr marL="2971800" indent="-228600" algn="l" defTabSz="914400" rtl="0" eaLnBrk="1" latinLnBrk="0" hangingPunct="1">
+      <a:lvl7pPr marL="2971800" indent="-228600" algn="r" defTabSz="914400" rtl="1" eaLnBrk="1" latinLnBrk="0" hangingPunct="1">
         <a:lnSpc>
           <a:spcPct val="90000"/>
         </a:lnSpc>
@@ -2795,7 +2795,7 @@
           <a:cs typeface="+mn-cs"/>
         </a:defRPr>
       </a:lvl7pPr>
-      <a:lvl8pPr marL="3429000" indent="-228600" algn="l" defTabSz="914400" rtl="0" eaLnBrk="1" latinLnBrk="0" hangingPunct="1">
+      <a:lvl8pPr marL="3429000" indent="-228600" algn="r" defTabSz="914400" rtl="1" eaLnBrk="1" latinLnBrk="0" hangingPunct="1">
         <a:lnSpc>
           <a:spcPct val="90000"/>
         </a:lnSpc>
@@ -2813,7 +2813,7 @@
           <a:cs typeface="+mn-cs"/>
         </a:defRPr>
       </a:lvl8pPr>
-      <a:lvl9pPr marL="3886200" indent="-228600" algn="l" defTabSz="914400" rtl="0" eaLnBrk="1" latinLnBrk="0" hangingPunct="1">
+      <a:lvl9pPr marL="3886200" indent="-228600" algn="r" defTabSz="914400" rtl="1" eaLnBrk="1" latinLnBrk="0" hangingPunct="1">
         <a:lnSpc>
           <a:spcPct val="90000"/>
         </a:lnSpc>
@@ -2836,7 +2836,7 @@
       <a:defPPr>
         <a:defRPr lang="ar-SA"/>
       </a:defPPr>
-      <a:lvl1pPr marL="0" algn="l" defTabSz="914400" rtl="0" eaLnBrk="1" latinLnBrk="0" hangingPunct="1">
+      <a:lvl1pPr marL="0" algn="r" defTabSz="914400" rtl="1" eaLnBrk="1" latinLnBrk="0" hangingPunct="1">
         <a:defRPr sz="1800" kern="1200">
           <a:solidFill>
             <a:schemeClr val="tx1"/>
@@ -2846,7 +2846,7 @@
           <a:cs typeface="+mn-cs"/>
         </a:defRPr>
       </a:lvl1pPr>
-      <a:lvl2pPr marL="457200" algn="l" defTabSz="914400" rtl="0" eaLnBrk="1" latinLnBrk="0" hangingPunct="1">
+      <a:lvl2pPr marL="457200" algn="r" defTabSz="914400" rtl="1" eaLnBrk="1" latinLnBrk="0" hangingPunct="1">
         <a:defRPr sz="1800" kern="1200">
           <a:solidFill>
             <a:schemeClr val="tx1"/>
@@ -2856,7 +2856,7 @@
           <a:cs typeface="+mn-cs"/>
         </a:defRPr>
       </a:lvl2pPr>
-      <a:lvl3pPr marL="914400" algn="l" defTabSz="914400" rtl="0" eaLnBrk="1" latinLnBrk="0" hangingPunct="1">
+      <a:lvl3pPr marL="914400" algn="r" defTabSz="914400" rtl="1" eaLnBrk="1" latinLnBrk="0" hangingPunct="1">
         <a:defRPr sz="1800" kern="1200">
           <a:solidFill>
             <a:schemeClr val="tx1"/>
@@ -2866,7 +2866,7 @@
           <a:cs typeface="+mn-cs"/>
         </a:defRPr>
       </a:lvl3pPr>
-      <a:lvl4pPr marL="1371600" algn="l" defTabSz="914400" rtl="0" eaLnBrk="1" latinLnBrk="0" hangingPunct="1">
+      <a:lvl4pPr marL="1371600" algn="r" defTabSz="914400" rtl="1" eaLnBrk="1" latinLnBrk="0" hangingPunct="1">
         <a:defRPr sz="1800" kern="1200">
           <a:solidFill>
             <a:schemeClr val="tx1"/>
@@ -2876,7 +2876,7 @@
           <a:cs typeface="+mn-cs"/>
         </a:defRPr>
       </a:lvl4pPr>
-      <a:lvl5pPr marL="1828800" algn="l" defTabSz="914400" rtl="0" eaLnBrk="1" latinLnBrk="0" hangingPunct="1">
+      <a:lvl5pPr marL="1828800" algn="r" defTabSz="914400" rtl="1" eaLnBrk="1" latinLnBrk="0" hangingPunct="1">
         <a:defRPr sz="1800" kern="1200">
           <a:solidFill>
             <a:schemeClr val="tx1"/>
@@ -2886,7 +2886,7 @@
           <a:cs typeface="+mn-cs"/>
         </a:defRPr>
       </a:lvl5pPr>
-      <a:lvl6pPr marL="2286000" algn="l" defTabSz="914400" rtl="0" eaLnBrk="1" latinLnBrk="0" hangingPunct="1">
+      <a:lvl6pPr marL="2286000" algn="r" defTabSz="914400" rtl="1" eaLnBrk="1" latinLnBrk="0" hangingPunct="1">
         <a:defRPr sz="1800" kern="1200">
           <a:solidFill>
             <a:schemeClr val="tx1"/>
@@ -2896,7 +2896,7 @@
           <a:cs typeface="+mn-cs"/>
         </a:defRPr>
       </a:lvl6pPr>
-      <a:lvl7pPr marL="2743200" algn="l" defTabSz="914400" rtl="0" eaLnBrk="1" latinLnBrk="0" hangingPunct="1">
+      <a:lvl7pPr marL="2743200" algn="r" defTabSz="914400" rtl="1" eaLnBrk="1" latinLnBrk="0" hangingPunct="1">
         <a:defRPr sz="1800" kern="1200">
           <a:solidFill>
             <a:schemeClr val="tx1"/>
@@ -2906,7 +2906,7 @@
           <a:cs typeface="+mn-cs"/>
         </a:defRPr>
       </a:lvl7pPr>
-      <a:lvl8pPr marL="3200400" algn="l" defTabSz="914400" rtl="0" eaLnBrk="1" latinLnBrk="0" hangingPunct="1">
+      <a:lvl8pPr marL="3200400" algn="r" defTabSz="914400" rtl="1" eaLnBrk="1" latinLnBrk="0" hangingPunct="1">
         <a:defRPr sz="1800" kern="1200">
           <a:solidFill>
             <a:schemeClr val="tx1"/>
@@ -2916,7 +2916,7 @@
           <a:cs typeface="+mn-cs"/>
         </a:defRPr>
       </a:lvl8pPr>
-      <a:lvl9pPr marL="3657600" algn="l" defTabSz="914400" rtl="0" eaLnBrk="1" latinLnBrk="0" hangingPunct="1">
+      <a:lvl9pPr marL="3657600" algn="r" defTabSz="914400" rtl="1" eaLnBrk="1" latinLnBrk="0" hangingPunct="1">
         <a:defRPr sz="1800" kern="1200">
           <a:solidFill>
             <a:schemeClr val="tx1"/>

</xml_diff>